<commit_message>
started building the package. Added roxygene description in "chronochart_import", started on a global wrapper function thing to let R automatically choose the correct function (read_xl or read_csv)
</commit_message>
<xml_diff>
--- a/Funding_Logos.pptx
+++ b/Funding_Logos.pptx
@@ -6,7 +6,9 @@
   </p:sldMasterIdLst>
   <p:sldIdLst>
     <p:sldId id="256" r:id="rId2"/>
-    <p:sldId id="257" r:id="rId3"/>
+    <p:sldId id="258" r:id="rId3"/>
+    <p:sldId id="259" r:id="rId4"/>
+    <p:sldId id="257" r:id="rId5"/>
   </p:sldIdLst>
   <p:sldSz cx="9144000" cy="5143500" type="screen16x9"/>
   <p:notesSz cx="6858000" cy="9144000"/>
@@ -289,6 +291,7 @@
           <a:p>
             <a:fld id="{50C76A27-9D95-45D5-9F50-DBA97D6708BF}" type="datetimeFigureOut">
               <a:rPr lang="de-DE" smtClean="0"/>
+              <a:pPr/>
               <a:t>22.09.2019</a:t>
             </a:fld>
             <a:endParaRPr lang="de-DE"/>
@@ -331,6 +334,7 @@
           <a:p>
             <a:fld id="{D6B2071C-858B-4385-AE84-7A203E32DB0D}" type="slidenum">
               <a:rPr lang="de-DE" smtClean="0"/>
+              <a:pPr/>
               <a:t>‹Nr.›</a:t>
             </a:fld>
             <a:endParaRPr lang="de-DE"/>
@@ -454,6 +458,7 @@
           <a:p>
             <a:fld id="{50C76A27-9D95-45D5-9F50-DBA97D6708BF}" type="datetimeFigureOut">
               <a:rPr lang="de-DE" smtClean="0"/>
+              <a:pPr/>
               <a:t>22.09.2019</a:t>
             </a:fld>
             <a:endParaRPr lang="de-DE"/>
@@ -496,6 +501,7 @@
           <a:p>
             <a:fld id="{D6B2071C-858B-4385-AE84-7A203E32DB0D}" type="slidenum">
               <a:rPr lang="de-DE" smtClean="0"/>
+              <a:pPr/>
               <a:t>‹Nr.›</a:t>
             </a:fld>
             <a:endParaRPr lang="de-DE"/>
@@ -629,6 +635,7 @@
           <a:p>
             <a:fld id="{50C76A27-9D95-45D5-9F50-DBA97D6708BF}" type="datetimeFigureOut">
               <a:rPr lang="de-DE" smtClean="0"/>
+              <a:pPr/>
               <a:t>22.09.2019</a:t>
             </a:fld>
             <a:endParaRPr lang="de-DE"/>
@@ -671,6 +678,7 @@
           <a:p>
             <a:fld id="{D6B2071C-858B-4385-AE84-7A203E32DB0D}" type="slidenum">
               <a:rPr lang="de-DE" smtClean="0"/>
+              <a:pPr/>
               <a:t>‹Nr.›</a:t>
             </a:fld>
             <a:endParaRPr lang="de-DE"/>
@@ -1226,6 +1234,7 @@
           <a:p>
             <a:fld id="{50C76A27-9D95-45D5-9F50-DBA97D6708BF}" type="datetimeFigureOut">
               <a:rPr lang="de-DE" smtClean="0"/>
+              <a:pPr/>
               <a:t>22.09.2019</a:t>
             </a:fld>
             <a:endParaRPr lang="de-DE"/>
@@ -1268,6 +1277,7 @@
           <a:p>
             <a:fld id="{D6B2071C-858B-4385-AE84-7A203E32DB0D}" type="slidenum">
               <a:rPr lang="de-DE" smtClean="0"/>
+              <a:pPr/>
               <a:t>‹Nr.›</a:t>
             </a:fld>
             <a:endParaRPr lang="de-DE"/>
@@ -1467,6 +1477,7 @@
           <a:p>
             <a:fld id="{50C76A27-9D95-45D5-9F50-DBA97D6708BF}" type="datetimeFigureOut">
               <a:rPr lang="de-DE" smtClean="0"/>
+              <a:pPr/>
               <a:t>22.09.2019</a:t>
             </a:fld>
             <a:endParaRPr lang="de-DE"/>
@@ -1509,6 +1520,7 @@
           <a:p>
             <a:fld id="{D6B2071C-858B-4385-AE84-7A203E32DB0D}" type="slidenum">
               <a:rPr lang="de-DE" smtClean="0"/>
+              <a:pPr/>
               <a:t>‹Nr.›</a:t>
             </a:fld>
             <a:endParaRPr lang="de-DE"/>
@@ -1750,6 +1762,7 @@
           <a:p>
             <a:fld id="{50C76A27-9D95-45D5-9F50-DBA97D6708BF}" type="datetimeFigureOut">
               <a:rPr lang="de-DE" smtClean="0"/>
+              <a:pPr/>
               <a:t>22.09.2019</a:t>
             </a:fld>
             <a:endParaRPr lang="de-DE"/>
@@ -1792,6 +1805,7 @@
           <a:p>
             <a:fld id="{D6B2071C-858B-4385-AE84-7A203E32DB0D}" type="slidenum">
               <a:rPr lang="de-DE" smtClean="0"/>
+              <a:pPr/>
               <a:t>‹Nr.›</a:t>
             </a:fld>
             <a:endParaRPr lang="de-DE"/>
@@ -2167,6 +2181,7 @@
           <a:p>
             <a:fld id="{50C76A27-9D95-45D5-9F50-DBA97D6708BF}" type="datetimeFigureOut">
               <a:rPr lang="de-DE" smtClean="0"/>
+              <a:pPr/>
               <a:t>22.09.2019</a:t>
             </a:fld>
             <a:endParaRPr lang="de-DE"/>
@@ -2209,6 +2224,7 @@
           <a:p>
             <a:fld id="{D6B2071C-858B-4385-AE84-7A203E32DB0D}" type="slidenum">
               <a:rPr lang="de-DE" smtClean="0"/>
+              <a:pPr/>
               <a:t>‹Nr.›</a:t>
             </a:fld>
             <a:endParaRPr lang="de-DE"/>
@@ -2280,6 +2296,7 @@
           <a:p>
             <a:fld id="{50C76A27-9D95-45D5-9F50-DBA97D6708BF}" type="datetimeFigureOut">
               <a:rPr lang="de-DE" smtClean="0"/>
+              <a:pPr/>
               <a:t>22.09.2019</a:t>
             </a:fld>
             <a:endParaRPr lang="de-DE"/>
@@ -2322,6 +2339,7 @@
           <a:p>
             <a:fld id="{D6B2071C-858B-4385-AE84-7A203E32DB0D}" type="slidenum">
               <a:rPr lang="de-DE" smtClean="0"/>
+              <a:pPr/>
               <a:t>‹Nr.›</a:t>
             </a:fld>
             <a:endParaRPr lang="de-DE"/>
@@ -2370,6 +2388,7 @@
           <a:p>
             <a:fld id="{50C76A27-9D95-45D5-9F50-DBA97D6708BF}" type="datetimeFigureOut">
               <a:rPr lang="de-DE" smtClean="0"/>
+              <a:pPr/>
               <a:t>22.09.2019</a:t>
             </a:fld>
             <a:endParaRPr lang="de-DE"/>
@@ -2412,6 +2431,7 @@
           <a:p>
             <a:fld id="{D6B2071C-858B-4385-AE84-7A203E32DB0D}" type="slidenum">
               <a:rPr lang="de-DE" smtClean="0"/>
+              <a:pPr/>
               <a:t>‹Nr.›</a:t>
             </a:fld>
             <a:endParaRPr lang="de-DE"/>
@@ -2642,6 +2662,7 @@
           <a:p>
             <a:fld id="{50C76A27-9D95-45D5-9F50-DBA97D6708BF}" type="datetimeFigureOut">
               <a:rPr lang="de-DE" smtClean="0"/>
+              <a:pPr/>
               <a:t>22.09.2019</a:t>
             </a:fld>
             <a:endParaRPr lang="de-DE"/>
@@ -2684,6 +2705,7 @@
           <a:p>
             <a:fld id="{D6B2071C-858B-4385-AE84-7A203E32DB0D}" type="slidenum">
               <a:rPr lang="de-DE" smtClean="0"/>
+              <a:pPr/>
               <a:t>‹Nr.›</a:t>
             </a:fld>
             <a:endParaRPr lang="de-DE"/>
@@ -2890,6 +2912,7 @@
           <a:p>
             <a:fld id="{50C76A27-9D95-45D5-9F50-DBA97D6708BF}" type="datetimeFigureOut">
               <a:rPr lang="de-DE" smtClean="0"/>
+              <a:pPr/>
               <a:t>22.09.2019</a:t>
             </a:fld>
             <a:endParaRPr lang="de-DE"/>
@@ -2932,6 +2955,7 @@
           <a:p>
             <a:fld id="{D6B2071C-858B-4385-AE84-7A203E32DB0D}" type="slidenum">
               <a:rPr lang="de-DE" smtClean="0"/>
+              <a:pPr/>
               <a:t>‹Nr.›</a:t>
             </a:fld>
             <a:endParaRPr lang="de-DE"/>
@@ -3098,6 +3122,7 @@
           <a:p>
             <a:fld id="{50C76A27-9D95-45D5-9F50-DBA97D6708BF}" type="datetimeFigureOut">
               <a:rPr lang="de-DE" smtClean="0"/>
+              <a:pPr/>
               <a:t>22.09.2019</a:t>
             </a:fld>
             <a:endParaRPr lang="de-DE"/>
@@ -3176,6 +3201,7 @@
           <a:p>
             <a:fld id="{D6B2071C-858B-4385-AE84-7A203E32DB0D}" type="slidenum">
               <a:rPr lang="de-DE" smtClean="0"/>
+              <a:pPr/>
               <a:t>‹Nr.›</a:t>
             </a:fld>
             <a:endParaRPr lang="de-DE"/>
@@ -3481,10 +3507,77 @@
         </p:nvSpPr>
         <p:spPr/>
         <p:txBody>
-          <a:bodyPr/>
-          <a:lstStyle/>
-          <a:p>
-            <a:endParaRPr lang="de-DE"/>
+          <a:bodyPr>
+            <a:normAutofit fontScale="90000"/>
+          </a:bodyPr>
+          <a:lstStyle/>
+          <a:p>
+            <a:r>
+              <a:rPr lang="de-DE" i="1" dirty="0" err="1" smtClean="0">
+                <a:latin typeface="Arial" pitchFamily="34" charset="0"/>
+                <a:cs typeface="Arial" pitchFamily="34" charset="0"/>
+              </a:rPr>
+              <a:t>ChronochRt</a:t>
+            </a:r>
+            <a:r>
+              <a:rPr lang="de-DE" i="1" dirty="0" smtClean="0">
+                <a:latin typeface="Arial" pitchFamily="34" charset="0"/>
+                <a:cs typeface="Arial" pitchFamily="34" charset="0"/>
+              </a:rPr>
+              <a:t> </a:t>
+            </a:r>
+            <a:r>
+              <a:rPr lang="de-DE" i="1" dirty="0" smtClean="0">
+                <a:latin typeface="Arial" pitchFamily="34" charset="0"/>
+                <a:cs typeface="Arial" pitchFamily="34" charset="0"/>
+              </a:rPr>
+              <a:t> </a:t>
+            </a:r>
+            <a:br>
+              <a:rPr lang="de-DE" i="1" dirty="0" smtClean="0">
+                <a:latin typeface="Arial" pitchFamily="34" charset="0"/>
+                <a:cs typeface="Arial" pitchFamily="34" charset="0"/>
+              </a:rPr>
+            </a:br>
+            <a:r>
+              <a:rPr lang="de-DE" sz="3600" i="1" dirty="0" smtClean="0">
+                <a:latin typeface="Arial" pitchFamily="34" charset="0"/>
+                <a:cs typeface="Arial" pitchFamily="34" charset="0"/>
+              </a:rPr>
+              <a:t>Ein </a:t>
+            </a:r>
+            <a:r>
+              <a:rPr lang="de-DE" sz="3600" i="1" dirty="0" smtClean="0">
+                <a:latin typeface="Arial" pitchFamily="34" charset="0"/>
+                <a:cs typeface="Arial" pitchFamily="34" charset="0"/>
+              </a:rPr>
+              <a:t>R-</a:t>
+            </a:r>
+            <a:r>
+              <a:rPr lang="de-DE" sz="3600" i="1" dirty="0" err="1" smtClean="0">
+                <a:latin typeface="Arial" pitchFamily="34" charset="0"/>
+                <a:cs typeface="Arial" pitchFamily="34" charset="0"/>
+              </a:rPr>
+              <a:t>package</a:t>
+            </a:r>
+            <a:r>
+              <a:rPr lang="de-DE" sz="3600" i="1" dirty="0" smtClean="0">
+                <a:latin typeface="Arial" pitchFamily="34" charset="0"/>
+                <a:cs typeface="Arial" pitchFamily="34" charset="0"/>
+              </a:rPr>
+              <a:t> zum automatisierten Erstellen von </a:t>
+            </a:r>
+            <a:r>
+              <a:rPr lang="de-DE" sz="3600" i="1" dirty="0" err="1" smtClean="0">
+                <a:latin typeface="Arial" pitchFamily="34" charset="0"/>
+                <a:cs typeface="Arial" pitchFamily="34" charset="0"/>
+              </a:rPr>
+              <a:t>Chronologietabellen</a:t>
+            </a:r>
+            <a:endParaRPr lang="de-DE" dirty="0">
+              <a:latin typeface="Arial" pitchFamily="34" charset="0"/>
+              <a:cs typeface="Arial" pitchFamily="34" charset="0"/>
+            </a:endParaRPr>
           </a:p>
         </p:txBody>
       </p:sp>
@@ -3498,12 +3591,135 @@
             <p:ph type="subTitle" idx="1"/>
           </p:nvPr>
         </p:nvSpPr>
-        <p:spPr/>
-        <p:txBody>
-          <a:bodyPr/>
-          <a:lstStyle/>
-          <a:p>
-            <a:endParaRPr lang="de-DE"/>
+        <p:spPr>
+          <a:xfrm>
+            <a:off x="500034" y="3286130"/>
+            <a:ext cx="7858180" cy="1357322"/>
+          </a:xfrm>
+        </p:spPr>
+        <p:txBody>
+          <a:bodyPr>
+            <a:noAutofit/>
+          </a:bodyPr>
+          <a:lstStyle/>
+          <a:p>
+            <a:r>
+              <a:rPr lang="en-US" sz="2000" dirty="0" smtClean="0">
+                <a:latin typeface="Arial Narrow" pitchFamily="34" charset="0"/>
+              </a:rPr>
+              <a:t>Thomas Rose</a:t>
+            </a:r>
+            <a:r>
+              <a:rPr lang="en-US" sz="1800" dirty="0" smtClean="0">
+                <a:latin typeface="Arial Narrow" pitchFamily="34" charset="0"/>
+              </a:rPr>
+              <a:t/>
+            </a:r>
+            <a:br>
+              <a:rPr lang="en-US" sz="1800" dirty="0" smtClean="0">
+                <a:latin typeface="Arial Narrow" pitchFamily="34" charset="0"/>
+              </a:rPr>
+            </a:br>
+            <a:r>
+              <a:rPr lang="en-US" sz="1800" dirty="0" smtClean="0">
+                <a:latin typeface="Arial Narrow" pitchFamily="34" charset="0"/>
+              </a:rPr>
+              <a:t>Ben </a:t>
+            </a:r>
+            <a:r>
+              <a:rPr lang="en-US" sz="1800" dirty="0" err="1" smtClean="0">
+                <a:latin typeface="Arial Narrow" pitchFamily="34" charset="0"/>
+              </a:rPr>
+              <a:t>Gurion</a:t>
+            </a:r>
+            <a:r>
+              <a:rPr lang="en-US" sz="1800" dirty="0" smtClean="0">
+                <a:latin typeface="Arial Narrow" pitchFamily="34" charset="0"/>
+              </a:rPr>
+              <a:t> University of the Negev, </a:t>
+            </a:r>
+            <a:r>
+              <a:rPr lang="en-US" sz="1800" dirty="0" err="1" smtClean="0">
+                <a:latin typeface="Arial Narrow" pitchFamily="34" charset="0"/>
+              </a:rPr>
+              <a:t>Be’er</a:t>
+            </a:r>
+            <a:r>
+              <a:rPr lang="en-US" sz="1800" dirty="0" smtClean="0">
+                <a:latin typeface="Arial Narrow" pitchFamily="34" charset="0"/>
+              </a:rPr>
+              <a:t> </a:t>
+            </a:r>
+            <a:r>
+              <a:rPr lang="en-US" sz="1800" dirty="0" err="1" smtClean="0">
+                <a:latin typeface="Arial Narrow" pitchFamily="34" charset="0"/>
+              </a:rPr>
+              <a:t>Sheva</a:t>
+            </a:r>
+            <a:r>
+              <a:rPr lang="en-US" sz="1800" dirty="0" smtClean="0">
+                <a:latin typeface="Arial Narrow" pitchFamily="34" charset="0"/>
+              </a:rPr>
+              <a:t>, </a:t>
+            </a:r>
+            <a:r>
+              <a:rPr lang="en-US" sz="1800" dirty="0" smtClean="0">
+                <a:latin typeface="Arial Narrow" pitchFamily="34" charset="0"/>
+              </a:rPr>
+              <a:t>Israel</a:t>
+            </a:r>
+          </a:p>
+          <a:p>
+            <a:r>
+              <a:rPr lang="de-DE" sz="2000" dirty="0" smtClean="0">
+                <a:latin typeface="Arial Narrow" pitchFamily="34" charset="0"/>
+              </a:rPr>
+              <a:t>Chiara G. M. </a:t>
+            </a:r>
+            <a:r>
+              <a:rPr lang="de-DE" sz="2000" dirty="0" err="1" smtClean="0">
+                <a:latin typeface="Arial Narrow" pitchFamily="34" charset="0"/>
+              </a:rPr>
+              <a:t>Girotto</a:t>
+            </a:r>
+            <a:r>
+              <a:rPr lang="de-DE" sz="1800" dirty="0" smtClean="0">
+                <a:latin typeface="Arial Narrow" pitchFamily="34" charset="0"/>
+              </a:rPr>
+              <a:t/>
+            </a:r>
+            <a:br>
+              <a:rPr lang="de-DE" sz="1800" dirty="0" smtClean="0">
+                <a:latin typeface="Arial Narrow" pitchFamily="34" charset="0"/>
+              </a:rPr>
+            </a:br>
+            <a:r>
+              <a:rPr lang="de-DE" sz="1800" dirty="0" smtClean="0">
+                <a:latin typeface="Arial Narrow" pitchFamily="34" charset="0"/>
+              </a:rPr>
+              <a:t>SPAU – Sascha </a:t>
+            </a:r>
+            <a:r>
+              <a:rPr lang="de-DE" sz="1800" dirty="0" err="1" smtClean="0">
+                <a:latin typeface="Arial Narrow" pitchFamily="34" charset="0"/>
+              </a:rPr>
+              <a:t>Piffko</a:t>
+            </a:r>
+            <a:r>
+              <a:rPr lang="de-DE" sz="1800" dirty="0" smtClean="0">
+                <a:latin typeface="Arial Narrow" pitchFamily="34" charset="0"/>
+              </a:rPr>
+              <a:t> Archäologische Untersuchungen, </a:t>
+            </a:r>
+            <a:r>
+              <a:rPr lang="de-DE" sz="1800" dirty="0" smtClean="0">
+                <a:latin typeface="Arial Narrow" pitchFamily="34" charset="0"/>
+              </a:rPr>
+              <a:t>Münzenberg</a:t>
+            </a:r>
+            <a:endParaRPr lang="de-DE" sz="1800" dirty="0">
+              <a:latin typeface="Arial Narrow" pitchFamily="34" charset="0"/>
+            </a:endParaRPr>
           </a:p>
         </p:txBody>
       </p:sp>
@@ -3516,6 +3732,555 @@
 </file>
 
 <file path=ppt/slides/slide2.xml><?xml version="1.0" encoding="utf-8"?>
+<p:sld xmlns:a="http://schemas.openxmlformats.org/drawingml/2006/main" xmlns:r="http://schemas.openxmlformats.org/officeDocument/2006/relationships" xmlns:p="http://schemas.openxmlformats.org/presentationml/2006/main">
+  <p:cSld>
+    <p:spTree>
+      <p:nvGrpSpPr>
+        <p:cNvPr id="1" name=""/>
+        <p:cNvGrpSpPr/>
+        <p:nvPr/>
+      </p:nvGrpSpPr>
+      <p:grpSpPr>
+        <a:xfrm>
+          <a:off x="0" y="0"/>
+          <a:ext cx="0" cy="0"/>
+          <a:chOff x="0" y="0"/>
+          <a:chExt cx="0" cy="0"/>
+        </a:xfrm>
+      </p:grpSpPr>
+      <p:sp>
+        <p:nvSpPr>
+          <p:cNvPr id="2" name="Titel 1"/>
+          <p:cNvSpPr>
+            <a:spLocks noGrp="1"/>
+          </p:cNvSpPr>
+          <p:nvPr>
+            <p:ph type="title"/>
+          </p:nvPr>
+        </p:nvSpPr>
+        <p:spPr/>
+        <p:txBody>
+          <a:bodyPr>
+            <a:normAutofit/>
+          </a:bodyPr>
+          <a:lstStyle/>
+          <a:p>
+            <a:r>
+              <a:rPr lang="de-DE" sz="4000" dirty="0" smtClean="0">
+                <a:latin typeface="Arial Narrow" pitchFamily="34" charset="0"/>
+              </a:rPr>
+              <a:t>Publikation von </a:t>
+            </a:r>
+            <a:r>
+              <a:rPr lang="de-DE" sz="4000" dirty="0" err="1" smtClean="0">
+                <a:latin typeface="Arial Narrow" pitchFamily="34" charset="0"/>
+              </a:rPr>
+              <a:t>Chronologietabellen</a:t>
+            </a:r>
+            <a:r>
+              <a:rPr lang="de-DE" sz="4000" dirty="0" smtClean="0">
+                <a:latin typeface="Arial Narrow" pitchFamily="34" charset="0"/>
+              </a:rPr>
+              <a:t>…</a:t>
+            </a:r>
+            <a:endParaRPr lang="de-DE" sz="4000" dirty="0">
+              <a:latin typeface="Arial Narrow" pitchFamily="34" charset="0"/>
+            </a:endParaRPr>
+          </a:p>
+        </p:txBody>
+      </p:sp>
+      <p:pic>
+        <p:nvPicPr>
+          <p:cNvPr id="1028" name="Picture 4" descr="http://www.dartmouth.edu/%7Eprehistory/aegean/wp-content/uploads/franchthiCave.png"/>
+          <p:cNvPicPr>
+            <a:picLocks noChangeAspect="1" noChangeArrowheads="1"/>
+          </p:cNvPicPr>
+          <p:nvPr/>
+        </p:nvPicPr>
+        <p:blipFill>
+          <a:blip r:embed="rId2"/>
+          <a:srcRect/>
+          <a:stretch>
+            <a:fillRect/>
+          </a:stretch>
+        </p:blipFill>
+        <p:spPr bwMode="auto">
+          <a:xfrm>
+            <a:off x="214282" y="1071552"/>
+            <a:ext cx="3333750" cy="3381375"/>
+          </a:xfrm>
+          <a:prstGeom prst="rect">
+            <a:avLst/>
+          </a:prstGeom>
+          <a:noFill/>
+        </p:spPr>
+      </p:pic>
+      <p:sp>
+        <p:nvSpPr>
+          <p:cNvPr id="6" name="Rechteck 5"/>
+          <p:cNvSpPr/>
+          <p:nvPr/>
+        </p:nvSpPr>
+        <p:spPr>
+          <a:xfrm rot="16200000">
+            <a:off x="1981047" y="2448059"/>
+            <a:ext cx="3500431" cy="461665"/>
+          </a:xfrm>
+          <a:prstGeom prst="rect">
+            <a:avLst/>
+          </a:prstGeom>
+        </p:spPr>
+        <p:txBody>
+          <a:bodyPr wrap="square">
+            <a:spAutoFit/>
+          </a:bodyPr>
+          <a:lstStyle/>
+          <a:p>
+            <a:r>
+              <a:rPr lang="de-DE" sz="1200" dirty="0" smtClean="0">
+                <a:solidFill>
+                  <a:schemeClr val="bg1">
+                    <a:lumMod val="50000"/>
+                  </a:schemeClr>
+                </a:solidFill>
+                <a:latin typeface="Arial Narrow" pitchFamily="34" charset="0"/>
+              </a:rPr>
+              <a:t>https://www.dartmouth.edu/~prehistory/aegean/?</a:t>
+            </a:r>
+            <a:r>
+              <a:rPr lang="de-DE" sz="1200" dirty="0" smtClean="0">
+                <a:solidFill>
+                  <a:schemeClr val="bg1">
+                    <a:lumMod val="50000"/>
+                  </a:schemeClr>
+                </a:solidFill>
+                <a:latin typeface="Arial Narrow" pitchFamily="34" charset="0"/>
+              </a:rPr>
+              <a:t>page_id=67, 22.09.2019.</a:t>
+            </a:r>
+            <a:endParaRPr lang="de-DE" sz="1200" dirty="0">
+              <a:solidFill>
+                <a:schemeClr val="bg1">
+                  <a:lumMod val="50000"/>
+                </a:schemeClr>
+              </a:solidFill>
+              <a:latin typeface="Arial Narrow" pitchFamily="34" charset="0"/>
+            </a:endParaRPr>
+          </a:p>
+        </p:txBody>
+      </p:sp>
+      <p:sp>
+        <p:nvSpPr>
+          <p:cNvPr id="7" name="Textfeld 6"/>
+          <p:cNvSpPr txBox="1"/>
+          <p:nvPr/>
+        </p:nvSpPr>
+        <p:spPr>
+          <a:xfrm>
+            <a:off x="214282" y="4500576"/>
+            <a:ext cx="3714776" cy="276999"/>
+          </a:xfrm>
+          <a:prstGeom prst="rect">
+            <a:avLst/>
+          </a:prstGeom>
+          <a:noFill/>
+        </p:spPr>
+        <p:txBody>
+          <a:bodyPr wrap="square" rtlCol="0">
+            <a:spAutoFit/>
+          </a:bodyPr>
+          <a:lstStyle/>
+          <a:p>
+            <a:r>
+              <a:rPr lang="de-DE" sz="1200" dirty="0" smtClean="0">
+                <a:latin typeface="Arial Narrow" pitchFamily="34" charset="0"/>
+              </a:rPr>
+              <a:t>Tabelle der ägäischen Vorgeschichte für eine Website.</a:t>
+            </a:r>
+            <a:endParaRPr lang="de-DE" sz="1200" dirty="0">
+              <a:latin typeface="Arial Narrow" pitchFamily="34" charset="0"/>
+            </a:endParaRPr>
+          </a:p>
+        </p:txBody>
+      </p:sp>
+      <p:sp>
+        <p:nvSpPr>
+          <p:cNvPr id="11" name="Textfeld 10"/>
+          <p:cNvSpPr txBox="1"/>
+          <p:nvPr/>
+        </p:nvSpPr>
+        <p:spPr>
+          <a:xfrm>
+            <a:off x="4286248" y="1214428"/>
+            <a:ext cx="4214842" cy="923330"/>
+          </a:xfrm>
+          <a:prstGeom prst="rect">
+            <a:avLst/>
+          </a:prstGeom>
+          <a:noFill/>
+        </p:spPr>
+        <p:txBody>
+          <a:bodyPr wrap="square" rtlCol="0">
+            <a:spAutoFit/>
+          </a:bodyPr>
+          <a:lstStyle/>
+          <a:p>
+            <a:pPr>
+              <a:buFont typeface="Arial" pitchFamily="34" charset="0"/>
+              <a:buChar char="•"/>
+            </a:pPr>
+            <a:r>
+              <a:rPr lang="de-DE" dirty="0" smtClean="0"/>
+              <a:t> Tabellen/Bildverarbeitungsprogramme</a:t>
+            </a:r>
+          </a:p>
+          <a:p>
+            <a:pPr lvl="1">
+              <a:buFont typeface="Arial" pitchFamily="34" charset="0"/>
+              <a:buChar char="•"/>
+            </a:pPr>
+            <a:r>
+              <a:rPr lang="de-DE" dirty="0" smtClean="0"/>
+              <a:t> zeitaufwendige Formatierung</a:t>
+            </a:r>
+          </a:p>
+          <a:p>
+            <a:pPr>
+              <a:buFont typeface="Arial" pitchFamily="34" charset="0"/>
+              <a:buChar char="•"/>
+            </a:pPr>
+            <a:endParaRPr lang="de-DE" dirty="0"/>
+          </a:p>
+        </p:txBody>
+      </p:sp>
+    </p:spTree>
+  </p:cSld>
+  <p:clrMapOvr>
+    <a:masterClrMapping/>
+  </p:clrMapOvr>
+</p:sld>
+</file>
+
+<file path=ppt/slides/slide3.xml><?xml version="1.0" encoding="utf-8"?>
+<p:sld xmlns:a="http://schemas.openxmlformats.org/drawingml/2006/main" xmlns:r="http://schemas.openxmlformats.org/officeDocument/2006/relationships" xmlns:p="http://schemas.openxmlformats.org/presentationml/2006/main">
+  <p:cSld>
+    <p:spTree>
+      <p:nvGrpSpPr>
+        <p:cNvPr id="1" name=""/>
+        <p:cNvGrpSpPr/>
+        <p:nvPr/>
+      </p:nvGrpSpPr>
+      <p:grpSpPr>
+        <a:xfrm>
+          <a:off x="0" y="0"/>
+          <a:ext cx="0" cy="0"/>
+          <a:chOff x="0" y="0"/>
+          <a:chExt cx="0" cy="0"/>
+        </a:xfrm>
+      </p:grpSpPr>
+      <p:sp>
+        <p:nvSpPr>
+          <p:cNvPr id="2" name="Titel 1"/>
+          <p:cNvSpPr>
+            <a:spLocks noGrp="1"/>
+          </p:cNvSpPr>
+          <p:nvPr>
+            <p:ph type="title"/>
+          </p:nvPr>
+        </p:nvSpPr>
+        <p:spPr/>
+        <p:txBody>
+          <a:bodyPr>
+            <a:normAutofit/>
+          </a:bodyPr>
+          <a:lstStyle/>
+          <a:p>
+            <a:r>
+              <a:rPr lang="de-DE" sz="4000" dirty="0" smtClean="0">
+                <a:latin typeface="Arial Narrow" pitchFamily="34" charset="0"/>
+              </a:rPr>
+              <a:t>Publikation von </a:t>
+            </a:r>
+            <a:r>
+              <a:rPr lang="de-DE" sz="4000" dirty="0" err="1" smtClean="0">
+                <a:latin typeface="Arial Narrow" pitchFamily="34" charset="0"/>
+              </a:rPr>
+              <a:t>Chronologietabellen</a:t>
+            </a:r>
+            <a:r>
+              <a:rPr lang="de-DE" sz="4000" dirty="0" smtClean="0">
+                <a:latin typeface="Arial Narrow" pitchFamily="34" charset="0"/>
+              </a:rPr>
+              <a:t>…</a:t>
+            </a:r>
+            <a:endParaRPr lang="de-DE" sz="4000" dirty="0">
+              <a:latin typeface="Arial Narrow" pitchFamily="34" charset="0"/>
+            </a:endParaRPr>
+          </a:p>
+        </p:txBody>
+      </p:sp>
+      <p:pic>
+        <p:nvPicPr>
+          <p:cNvPr id="1028" name="Picture 4" descr="http://www.dartmouth.edu/%7Eprehistory/aegean/wp-content/uploads/franchthiCave.png"/>
+          <p:cNvPicPr>
+            <a:picLocks noChangeAspect="1" noChangeArrowheads="1"/>
+          </p:cNvPicPr>
+          <p:nvPr/>
+        </p:nvPicPr>
+        <p:blipFill>
+          <a:blip r:embed="rId2"/>
+          <a:srcRect/>
+          <a:stretch>
+            <a:fillRect/>
+          </a:stretch>
+        </p:blipFill>
+        <p:spPr bwMode="auto">
+          <a:xfrm>
+            <a:off x="214282" y="1071552"/>
+            <a:ext cx="3333750" cy="3381375"/>
+          </a:xfrm>
+          <a:prstGeom prst="rect">
+            <a:avLst/>
+          </a:prstGeom>
+          <a:noFill/>
+        </p:spPr>
+      </p:pic>
+      <p:sp>
+        <p:nvSpPr>
+          <p:cNvPr id="6" name="Rechteck 5"/>
+          <p:cNvSpPr/>
+          <p:nvPr/>
+        </p:nvSpPr>
+        <p:spPr>
+          <a:xfrm rot="16200000">
+            <a:off x="1981047" y="2448059"/>
+            <a:ext cx="3500431" cy="461665"/>
+          </a:xfrm>
+          <a:prstGeom prst="rect">
+            <a:avLst/>
+          </a:prstGeom>
+        </p:spPr>
+        <p:txBody>
+          <a:bodyPr wrap="square">
+            <a:spAutoFit/>
+          </a:bodyPr>
+          <a:lstStyle/>
+          <a:p>
+            <a:r>
+              <a:rPr lang="de-DE" sz="1200" dirty="0" smtClean="0">
+                <a:solidFill>
+                  <a:schemeClr val="bg1">
+                    <a:lumMod val="50000"/>
+                  </a:schemeClr>
+                </a:solidFill>
+                <a:latin typeface="Arial Narrow" pitchFamily="34" charset="0"/>
+              </a:rPr>
+              <a:t>https://www.dartmouth.edu/~prehistory/aegean/?</a:t>
+            </a:r>
+            <a:r>
+              <a:rPr lang="de-DE" sz="1200" dirty="0" smtClean="0">
+                <a:solidFill>
+                  <a:schemeClr val="bg1">
+                    <a:lumMod val="50000"/>
+                  </a:schemeClr>
+                </a:solidFill>
+                <a:latin typeface="Arial Narrow" pitchFamily="34" charset="0"/>
+              </a:rPr>
+              <a:t>page_id=67, 22.09.2019.</a:t>
+            </a:r>
+            <a:endParaRPr lang="de-DE" sz="1200" dirty="0">
+              <a:solidFill>
+                <a:schemeClr val="bg1">
+                  <a:lumMod val="50000"/>
+                </a:schemeClr>
+              </a:solidFill>
+              <a:latin typeface="Arial Narrow" pitchFamily="34" charset="0"/>
+            </a:endParaRPr>
+          </a:p>
+        </p:txBody>
+      </p:sp>
+      <p:sp>
+        <p:nvSpPr>
+          <p:cNvPr id="7" name="Textfeld 6"/>
+          <p:cNvSpPr txBox="1"/>
+          <p:nvPr/>
+        </p:nvSpPr>
+        <p:spPr>
+          <a:xfrm>
+            <a:off x="214282" y="4500576"/>
+            <a:ext cx="3714776" cy="276999"/>
+          </a:xfrm>
+          <a:prstGeom prst="rect">
+            <a:avLst/>
+          </a:prstGeom>
+          <a:noFill/>
+        </p:spPr>
+        <p:txBody>
+          <a:bodyPr wrap="square" rtlCol="0">
+            <a:spAutoFit/>
+          </a:bodyPr>
+          <a:lstStyle/>
+          <a:p>
+            <a:r>
+              <a:rPr lang="de-DE" sz="1200" dirty="0" smtClean="0">
+                <a:latin typeface="Arial Narrow" pitchFamily="34" charset="0"/>
+              </a:rPr>
+              <a:t>Tabelle der ägäischen Vorgeschichte für eine Website.</a:t>
+            </a:r>
+            <a:endParaRPr lang="de-DE" sz="1200" dirty="0">
+              <a:latin typeface="Arial Narrow" pitchFamily="34" charset="0"/>
+            </a:endParaRPr>
+          </a:p>
+        </p:txBody>
+      </p:sp>
+      <p:pic>
+        <p:nvPicPr>
+          <p:cNvPr id="1030" name="Picture 6" descr="Timeline"/>
+          <p:cNvPicPr>
+            <a:picLocks noChangeAspect="1" noChangeArrowheads="1"/>
+          </p:cNvPicPr>
+          <p:nvPr/>
+        </p:nvPicPr>
+        <p:blipFill>
+          <a:blip r:embed="rId3"/>
+          <a:srcRect r="17409" b="52737"/>
+          <a:stretch>
+            <a:fillRect/>
+          </a:stretch>
+        </p:blipFill>
+        <p:spPr bwMode="auto">
+          <a:xfrm>
+            <a:off x="4143372" y="1071552"/>
+            <a:ext cx="4297270" cy="3286148"/>
+          </a:xfrm>
+          <a:prstGeom prst="rect">
+            <a:avLst/>
+          </a:prstGeom>
+          <a:noFill/>
+        </p:spPr>
+      </p:pic>
+      <p:sp>
+        <p:nvSpPr>
+          <p:cNvPr id="9" name="Textfeld 8"/>
+          <p:cNvSpPr txBox="1"/>
+          <p:nvPr/>
+        </p:nvSpPr>
+        <p:spPr>
+          <a:xfrm>
+            <a:off x="4500562" y="4500576"/>
+            <a:ext cx="3714776" cy="276999"/>
+          </a:xfrm>
+          <a:prstGeom prst="rect">
+            <a:avLst/>
+          </a:prstGeom>
+          <a:noFill/>
+        </p:spPr>
+        <p:txBody>
+          <a:bodyPr wrap="square" rtlCol="0">
+            <a:spAutoFit/>
+          </a:bodyPr>
+          <a:lstStyle/>
+          <a:p>
+            <a:r>
+              <a:rPr lang="de-DE" sz="1200" dirty="0" smtClean="0">
+                <a:latin typeface="Arial Narrow" pitchFamily="34" charset="0"/>
+              </a:rPr>
+              <a:t>„typisch“ archäologische </a:t>
+            </a:r>
+            <a:r>
+              <a:rPr lang="de-DE" sz="1200" dirty="0" err="1" smtClean="0">
+                <a:latin typeface="Arial Narrow" pitchFamily="34" charset="0"/>
+              </a:rPr>
+              <a:t>Chronologietabelle</a:t>
+            </a:r>
+            <a:r>
+              <a:rPr lang="de-DE" sz="1200" dirty="0" smtClean="0">
+                <a:latin typeface="Arial Narrow" pitchFamily="34" charset="0"/>
+              </a:rPr>
+              <a:t>.</a:t>
+            </a:r>
+            <a:endParaRPr lang="de-DE" sz="1200" dirty="0">
+              <a:latin typeface="Arial Narrow" pitchFamily="34" charset="0"/>
+            </a:endParaRPr>
+          </a:p>
+        </p:txBody>
+      </p:sp>
+      <p:sp>
+        <p:nvSpPr>
+          <p:cNvPr id="10" name="Rechteck 9"/>
+          <p:cNvSpPr/>
+          <p:nvPr/>
+        </p:nvSpPr>
+        <p:spPr>
+          <a:xfrm rot="16200000">
+            <a:off x="6910254" y="2519512"/>
+            <a:ext cx="3500461" cy="461665"/>
+          </a:xfrm>
+          <a:prstGeom prst="rect">
+            <a:avLst/>
+          </a:prstGeom>
+        </p:spPr>
+        <p:txBody>
+          <a:bodyPr wrap="square">
+            <a:spAutoFit/>
+          </a:bodyPr>
+          <a:lstStyle/>
+          <a:p>
+            <a:r>
+              <a:rPr lang="de-DE" sz="1200" dirty="0" smtClean="0">
+                <a:solidFill>
+                  <a:schemeClr val="bg1">
+                    <a:lumMod val="50000"/>
+                  </a:schemeClr>
+                </a:solidFill>
+                <a:latin typeface="Arial Narrow" pitchFamily="34" charset="0"/>
+              </a:rPr>
+              <a:t>http://</a:t>
+            </a:r>
+            <a:r>
+              <a:rPr lang="de-DE" sz="1200" dirty="0" smtClean="0">
+                <a:solidFill>
+                  <a:schemeClr val="bg1">
+                    <a:lumMod val="50000"/>
+                  </a:schemeClr>
+                </a:solidFill>
+                <a:latin typeface="Arial Narrow" pitchFamily="34" charset="0"/>
+              </a:rPr>
+              <a:t>aragats.arts.cornell.edu/wp-content/uploads/2012/10/</a:t>
+            </a:r>
+          </a:p>
+          <a:p>
+            <a:r>
+              <a:rPr lang="de-DE" sz="1200" dirty="0" smtClean="0">
+                <a:solidFill>
+                  <a:schemeClr val="bg1">
+                    <a:lumMod val="50000"/>
+                  </a:schemeClr>
+                </a:solidFill>
+                <a:latin typeface="Arial Narrow" pitchFamily="34" charset="0"/>
+              </a:rPr>
+              <a:t>Timeline.png, Ausschnitt, 22.09.2019 </a:t>
+            </a:r>
+            <a:endParaRPr lang="de-DE" sz="1200" dirty="0">
+              <a:solidFill>
+                <a:schemeClr val="bg1">
+                  <a:lumMod val="50000"/>
+                </a:schemeClr>
+              </a:solidFill>
+              <a:latin typeface="Arial Narrow" pitchFamily="34" charset="0"/>
+            </a:endParaRPr>
+          </a:p>
+        </p:txBody>
+      </p:sp>
+    </p:spTree>
+  </p:cSld>
+  <p:clrMapOvr>
+    <a:masterClrMapping/>
+  </p:clrMapOvr>
+</p:sld>
+</file>
+
+<file path=ppt/slides/slide4.xml><?xml version="1.0" encoding="utf-8"?>
 <p:sld xmlns:a="http://schemas.openxmlformats.org/drawingml/2006/main" xmlns:r="http://schemas.openxmlformats.org/officeDocument/2006/relationships" xmlns:p="http://schemas.openxmlformats.org/presentationml/2006/main">
   <p:cSld>
     <p:spTree>

</xml_diff>